<commit_message>
typo fix in presentation
</commit_message>
<xml_diff>
--- a/Presentations/RoboticorpLab3.pptx
+++ b/Presentations/RoboticorpLab3.pptx
@@ -1930,7 +1930,7 @@
           <a:p>
             <a:fld id="{F8895B77-7275-4675-9A60-791168BA2EF7}" type="datetimeFigureOut">
               <a:rPr lang="en-US" smtClean="0"/>
-              <a:t>2/25/13</a:t>
+              <a:t>2/25/2013</a:t>
             </a:fld>
             <a:endParaRPr lang="en-US"/>
           </a:p>
@@ -2111,7 +2111,7 @@
           <a:p>
             <a:fld id="{F8895B77-7275-4675-9A60-791168BA2EF7}" type="datetimeFigureOut">
               <a:rPr lang="en-US" smtClean="0"/>
-              <a:t>2/25/13</a:t>
+              <a:t>2/25/2013</a:t>
             </a:fld>
             <a:endParaRPr lang="en-US"/>
           </a:p>
@@ -2262,7 +2262,7 @@
           <a:p>
             <a:fld id="{F8895B77-7275-4675-9A60-791168BA2EF7}" type="datetimeFigureOut">
               <a:rPr lang="en-US" smtClean="0"/>
-              <a:t>2/25/13</a:t>
+              <a:t>2/25/2013</a:t>
             </a:fld>
             <a:endParaRPr lang="en-US"/>
           </a:p>
@@ -4088,7 +4088,7 @@
           <a:p>
             <a:fld id="{F8895B77-7275-4675-9A60-791168BA2EF7}" type="datetimeFigureOut">
               <a:rPr lang="en-US" smtClean="0"/>
-              <a:t>2/25/13</a:t>
+              <a:t>2/25/2013</a:t>
             </a:fld>
             <a:endParaRPr lang="en-US"/>
           </a:p>
@@ -5958,7 +5958,7 @@
           <a:p>
             <a:fld id="{F8895B77-7275-4675-9A60-791168BA2EF7}" type="datetimeFigureOut">
               <a:rPr lang="en-US" smtClean="0"/>
-              <a:t>2/25/13</a:t>
+              <a:t>2/25/2013</a:t>
             </a:fld>
             <a:endParaRPr lang="en-US"/>
           </a:p>
@@ -6071,7 +6071,7 @@
           <a:p>
             <a:fld id="{F8895B77-7275-4675-9A60-791168BA2EF7}" type="datetimeFigureOut">
               <a:rPr lang="en-US" smtClean="0"/>
-              <a:t>2/25/13</a:t>
+              <a:t>2/25/2013</a:t>
             </a:fld>
             <a:endParaRPr lang="en-US"/>
           </a:p>
@@ -6612,7 +6612,7 @@
           <a:p>
             <a:fld id="{F8895B77-7275-4675-9A60-791168BA2EF7}" type="datetimeFigureOut">
               <a:rPr lang="en-US" smtClean="0"/>
-              <a:t>2/25/13</a:t>
+              <a:t>2/25/2013</a:t>
             </a:fld>
             <a:endParaRPr lang="en-US"/>
           </a:p>
@@ -6725,7 +6725,7 @@
           <a:p>
             <a:fld id="{F8895B77-7275-4675-9A60-791168BA2EF7}" type="datetimeFigureOut">
               <a:rPr lang="en-US" smtClean="0"/>
-              <a:t>2/25/13</a:t>
+              <a:t>2/25/2013</a:t>
             </a:fld>
             <a:endParaRPr lang="en-US"/>
           </a:p>
@@ -8436,7 +8436,7 @@
           <a:p>
             <a:fld id="{F8895B77-7275-4675-9A60-791168BA2EF7}" type="datetimeFigureOut">
               <a:rPr lang="en-US" smtClean="0"/>
-              <a:t>2/25/13</a:t>
+              <a:t>2/25/2013</a:t>
             </a:fld>
             <a:endParaRPr lang="en-US"/>
           </a:p>
@@ -8587,7 +8587,7 @@
           <a:p>
             <a:fld id="{F8895B77-7275-4675-9A60-791168BA2EF7}" type="datetimeFigureOut">
               <a:rPr lang="en-US" smtClean="0"/>
-              <a:t>2/25/13</a:t>
+              <a:t>2/25/2013</a:t>
             </a:fld>
             <a:endParaRPr lang="en-US"/>
           </a:p>
@@ -12202,7 +12202,7 @@
           <a:p>
             <a:fld id="{F8895B77-7275-4675-9A60-791168BA2EF7}" type="datetimeFigureOut">
               <a:rPr lang="en-US" smtClean="0"/>
-              <a:t>2/25/13</a:t>
+              <a:t>2/25/2013</a:t>
             </a:fld>
             <a:endParaRPr lang="en-US"/>
           </a:p>
@@ -14061,7 +14061,7 @@
           <a:p>
             <a:fld id="{F8895B77-7275-4675-9A60-791168BA2EF7}" type="datetimeFigureOut">
               <a:rPr lang="en-US" smtClean="0"/>
-              <a:t>2/25/13</a:t>
+              <a:t>2/25/2013</a:t>
             </a:fld>
             <a:endParaRPr lang="en-US"/>
           </a:p>
@@ -14689,7 +14689,7 @@
   <p:timing>
     <p:tnLst>
       <p:par>
-        <p:cTn xmlns:p14="http://schemas.microsoft.com/office/powerpoint/2010/main" id="1" dur="indefinite" restart="never" nodeType="tmRoot"/>
+        <p:cTn id="1" dur="indefinite" restart="never" nodeType="tmRoot"/>
       </p:par>
     </p:tnLst>
   </p:timing>
@@ -14805,7 +14805,7 @@
   <p:timing>
     <p:tnLst>
       <p:par>
-        <p:cTn xmlns:p14="http://schemas.microsoft.com/office/powerpoint/2010/main" id="1" dur="indefinite" restart="never" nodeType="tmRoot"/>
+        <p:cTn id="1" dur="indefinite" restart="never" nodeType="tmRoot"/>
       </p:par>
     </p:tnLst>
   </p:timing>
@@ -14914,7 +14914,7 @@
   <p:timing>
     <p:tnLst>
       <p:par>
-        <p:cTn xmlns:p14="http://schemas.microsoft.com/office/powerpoint/2010/main" id="1" dur="indefinite" restart="never" nodeType="tmRoot"/>
+        <p:cTn id="1" dur="indefinite" restart="never" nodeType="tmRoot"/>
       </p:par>
     </p:tnLst>
   </p:timing>
@@ -15026,7 +15026,7 @@
   <p:timing>
     <p:tnLst>
       <p:par>
-        <p:cTn xmlns:p14="http://schemas.microsoft.com/office/powerpoint/2010/main" id="1" dur="indefinite" restart="never" nodeType="tmRoot"/>
+        <p:cTn id="1" dur="indefinite" restart="never" nodeType="tmRoot"/>
       </p:par>
     </p:tnLst>
   </p:timing>
@@ -15160,7 +15160,7 @@
   <p:timing>
     <p:tnLst>
       <p:par>
-        <p:cTn xmlns:p14="http://schemas.microsoft.com/office/powerpoint/2010/main" id="1" dur="indefinite" restart="never" nodeType="tmRoot"/>
+        <p:cTn id="1" dur="indefinite" restart="never" nodeType="tmRoot"/>
       </p:par>
     </p:tnLst>
   </p:timing>
@@ -15358,7 +15358,7 @@
   <p:timing>
     <p:tnLst>
       <p:par>
-        <p:cTn xmlns:p14="http://schemas.microsoft.com/office/powerpoint/2010/main" id="1" dur="indefinite" restart="never" nodeType="tmRoot"/>
+        <p:cTn id="1" dur="indefinite" restart="never" nodeType="tmRoot"/>
       </p:par>
     </p:tnLst>
   </p:timing>
@@ -15539,7 +15539,7 @@
   <p:timing>
     <p:tnLst>
       <p:par>
-        <p:cTn xmlns:p14="http://schemas.microsoft.com/office/powerpoint/2010/main" id="1" dur="indefinite" restart="never" nodeType="tmRoot"/>
+        <p:cTn id="1" dur="indefinite" restart="never" nodeType="tmRoot"/>
       </p:par>
     </p:tnLst>
   </p:timing>
@@ -15608,12 +15608,12 @@
           <a:lstStyle/>
           <a:p>
             <a:r>
-              <a:rPr lang="en-US" dirty="0" err="1" smtClean="0"/>
-              <a:t>Gandtt</a:t>
+              <a:rPr lang="en-US" smtClean="0"/>
+              <a:t>Gantt </a:t>
             </a:r>
             <a:r>
               <a:rPr lang="en-US" dirty="0" smtClean="0"/>
-              <a:t> Chart</a:t>
+              <a:t>Chart</a:t>
             </a:r>
             <a:endParaRPr lang="en-US" dirty="0"/>
           </a:p>
@@ -15632,7 +15632,7 @@
   <p:timing>
     <p:tnLst>
       <p:par>
-        <p:cTn xmlns:p14="http://schemas.microsoft.com/office/powerpoint/2010/main" id="1" dur="indefinite" restart="never" nodeType="tmRoot"/>
+        <p:cTn id="1" dur="indefinite" restart="never" nodeType="tmRoot"/>
       </p:par>
     </p:tnLst>
   </p:timing>
@@ -15753,7 +15753,7 @@
   <p:timing>
     <p:tnLst>
       <p:par>
-        <p:cTn xmlns:p14="http://schemas.microsoft.com/office/powerpoint/2010/main" id="1" dur="indefinite" restart="never" nodeType="tmRoot"/>
+        <p:cTn id="1" dur="indefinite" restart="never" nodeType="tmRoot"/>
       </p:par>
     </p:tnLst>
   </p:timing>
@@ -15859,7 +15859,7 @@
   <p:timing>
     <p:tnLst>
       <p:par>
-        <p:cTn xmlns:p14="http://schemas.microsoft.com/office/powerpoint/2010/main" id="1" dur="indefinite" restart="never" nodeType="tmRoot"/>
+        <p:cTn id="1" dur="indefinite" restart="never" nodeType="tmRoot"/>
       </p:par>
     </p:tnLst>
   </p:timing>
@@ -15959,7 +15959,7 @@
   <p:timing>
     <p:tnLst>
       <p:par>
-        <p:cTn xmlns:p14="http://schemas.microsoft.com/office/powerpoint/2010/main" id="1" dur="indefinite" restart="never" nodeType="tmRoot"/>
+        <p:cTn id="1" dur="indefinite" restart="never" nodeType="tmRoot"/>
       </p:par>
     </p:tnLst>
   </p:timing>
@@ -16103,7 +16103,7 @@
   <p:timing>
     <p:tnLst>
       <p:par>
-        <p:cTn xmlns:p14="http://schemas.microsoft.com/office/powerpoint/2010/main" id="1" dur="indefinite" restart="never" nodeType="tmRoot"/>
+        <p:cTn id="1" dur="indefinite" restart="never" nodeType="tmRoot"/>
       </p:par>
     </p:tnLst>
   </p:timing>

</xml_diff>